<commit_message>
Open Sans -> Arial
</commit_message>
<xml_diff>
--- a/Template_Rstudio_ENW.pptx
+++ b/Template_Rstudio_ENW.pptx
@@ -197,7 +197,7 @@
           <a:p>
             <a:fld id="{FFCC648E-062D-3547-B244-4E5790310580}" type="datetimeFigureOut">
               <a:rPr lang="en-US" smtClean="0"/>
-              <a:t>1/25/22</a:t>
+              <a:t>5/3/22</a:t>
             </a:fld>
             <a:endParaRPr lang="en-US"/>
           </a:p>
@@ -500,7 +500,7 @@
         <p:spPr>
           <a:xfrm>
             <a:off x="0" y="1006614"/>
-            <a:ext cx="9144000" cy="2096358"/>
+            <a:ext cx="9144000" cy="1733389"/>
           </a:xfrm>
           <a:prstGeom prst="rect">
             <a:avLst/>
@@ -508,20 +508,20 @@
         </p:spPr>
         <p:txBody>
           <a:bodyPr anchor="ctr">
-            <a:normAutofit/>
+            <a:noAutofit/>
           </a:bodyPr>
           <a:lstStyle>
             <a:lvl1pPr algn="ctr" fontAlgn="ctr">
-              <a:defRPr sz="4800" b="1" i="0" spc="-150" baseline="0">
+              <a:defRPr sz="6000" b="1" i="0" spc="-150" baseline="0">
                 <a:solidFill>
                   <a:schemeClr val="tx1">
                     <a:lumMod val="75000"/>
                     <a:lumOff val="25000"/>
                   </a:schemeClr>
                 </a:solidFill>
-                <a:latin typeface="Open Sans SemiBold" panose="020B0606030504020204" pitchFamily="34" charset="0"/>
+                <a:latin typeface="Arial" panose="020B0604020202020204" pitchFamily="34" charset="0"/>
                 <a:ea typeface="Open Sans SemiBold" panose="020B0606030504020204" pitchFamily="34" charset="0"/>
-                <a:cs typeface="Open Sans SemiBold" panose="020B0606030504020204" pitchFamily="34" charset="0"/>
+                <a:cs typeface="Arial" panose="020B0604020202020204" pitchFamily="34" charset="0"/>
               </a:defRPr>
             </a:lvl1pPr>
           </a:lstStyle>
@@ -551,8 +551,8 @@
         </p:nvSpPr>
         <p:spPr>
           <a:xfrm>
-            <a:off x="1143000" y="3109299"/>
-            <a:ext cx="6858000" cy="1257854"/>
+            <a:off x="1143000" y="2867891"/>
+            <a:ext cx="6858000" cy="1499262"/>
           </a:xfrm>
         </p:spPr>
         <p:txBody>
@@ -572,9 +572,9 @@
                     <a:lumOff val="50000"/>
                   </a:schemeClr>
                 </a:solidFill>
-                <a:latin typeface="Open Sans SemiBold" panose="020B0606030504020204" pitchFamily="34" charset="0"/>
+                <a:latin typeface="Arial" panose="020B0604020202020204" pitchFamily="34" charset="0"/>
                 <a:ea typeface="Open Sans SemiBold" panose="020B0606030504020204" pitchFamily="34" charset="0"/>
-                <a:cs typeface="Open Sans SemiBold" panose="020B0606030504020204" pitchFamily="34" charset="0"/>
+                <a:cs typeface="Arial" panose="020B0604020202020204" pitchFamily="34" charset="0"/>
               </a:defRPr>
             </a:lvl1pPr>
             <a:lvl2pPr marL="457200" indent="0" algn="ctr">
@@ -740,7 +740,7 @@
           <a:p>
             <a:fld id="{E70723BA-A8DB-B24C-99CB-32B8173B439B}" type="datetimeFigureOut">
               <a:rPr lang="en-US" smtClean="0"/>
-              <a:t>1/25/22</a:t>
+              <a:t>5/3/22</a:t>
             </a:fld>
             <a:endParaRPr lang="en-US"/>
           </a:p>
@@ -920,7 +920,7 @@
           <a:p>
             <a:fld id="{E70723BA-A8DB-B24C-99CB-32B8173B439B}" type="datetimeFigureOut">
               <a:rPr lang="en-US" smtClean="0"/>
-              <a:t>1/25/22</a:t>
+              <a:t>5/3/22</a:t>
             </a:fld>
             <a:endParaRPr lang="en-US"/>
           </a:p>
@@ -1023,9 +1023,9 @@
                 <a:solidFill>
                   <a:schemeClr val="tx1"/>
                 </a:solidFill>
-                <a:latin typeface="Open Sans" panose="020B0606030504020204" pitchFamily="34" charset="0"/>
+                <a:latin typeface="Arial" panose="020B0604020202020204" pitchFamily="34" charset="0"/>
                 <a:ea typeface="Open Sans" panose="020B0606030504020204" pitchFamily="34" charset="0"/>
-                <a:cs typeface="Open Sans" panose="020B0606030504020204" pitchFamily="34" charset="0"/>
+                <a:cs typeface="Arial" panose="020B0604020202020204" pitchFamily="34" charset="0"/>
               </a:defRPr>
             </a:lvl1pPr>
             <a:lvl2pPr marL="342900" indent="0">
@@ -1153,9 +1153,9 @@
                     <a:lumOff val="25000"/>
                   </a:schemeClr>
                 </a:solidFill>
-                <a:latin typeface="Open Sans SemiBold" panose="020B0606030504020204" pitchFamily="34" charset="0"/>
+                <a:latin typeface="Arial" panose="020B0604020202020204" pitchFamily="34" charset="0"/>
                 <a:ea typeface="Open Sans SemiBold" panose="020B0606030504020204" pitchFamily="34" charset="0"/>
-                <a:cs typeface="Open Sans SemiBold" panose="020B0606030504020204" pitchFamily="34" charset="0"/>
+                <a:cs typeface="Arial" panose="020B0604020202020204" pitchFamily="34" charset="0"/>
               </a:defRPr>
             </a:lvl1pPr>
           </a:lstStyle>
@@ -1233,9 +1233,9 @@
                     <a:lumOff val="25000"/>
                   </a:schemeClr>
                 </a:solidFill>
-                <a:latin typeface="Open Sans SemiBold" panose="020B0606030504020204" pitchFamily="34" charset="0"/>
+                <a:latin typeface="Arial" panose="020B0604020202020204" pitchFamily="34" charset="0"/>
                 <a:ea typeface="Open Sans SemiBold" panose="020B0606030504020204" pitchFamily="34" charset="0"/>
-                <a:cs typeface="Open Sans SemiBold" panose="020B0606030504020204" pitchFamily="34" charset="0"/>
+                <a:cs typeface="Arial" panose="020B0604020202020204" pitchFamily="34" charset="0"/>
               </a:defRPr>
             </a:lvl1pPr>
           </a:lstStyle>
@@ -1284,9 +1284,9 @@
                     <a:lumOff val="25000"/>
                   </a:schemeClr>
                 </a:solidFill>
-                <a:latin typeface="Open Sans" panose="020B0606030504020204" pitchFamily="34" charset="0"/>
+                <a:latin typeface="Arial" panose="020B0604020202020204" pitchFamily="34" charset="0"/>
                 <a:ea typeface="Open Sans" panose="020B0606030504020204" pitchFamily="34" charset="0"/>
-                <a:cs typeface="Open Sans" panose="020B0606030504020204" pitchFamily="34" charset="0"/>
+                <a:cs typeface="Arial" panose="020B0604020202020204" pitchFamily="34" charset="0"/>
               </a:defRPr>
             </a:lvl1pPr>
             <a:lvl2pPr marL="439737" indent="-342900">
@@ -1322,9 +1322,9 @@
                     <a:lumOff val="25000"/>
                   </a:schemeClr>
                 </a:solidFill>
-                <a:latin typeface="Open Sans" panose="020B0606030504020204" pitchFamily="34" charset="0"/>
+                <a:latin typeface="Arial" panose="020B0604020202020204" pitchFamily="34" charset="0"/>
                 <a:ea typeface="Open Sans" panose="020B0606030504020204" pitchFamily="34" charset="0"/>
-                <a:cs typeface="Open Sans" panose="020B0606030504020204" pitchFamily="34" charset="0"/>
+                <a:cs typeface="Arial" panose="020B0604020202020204" pitchFamily="34" charset="0"/>
               </a:defRPr>
             </a:lvl3pPr>
             <a:lvl4pPr marL="1657350" indent="-285750">
@@ -1340,9 +1340,9 @@
                     <a:lumOff val="25000"/>
                   </a:schemeClr>
                 </a:solidFill>
-                <a:latin typeface="Open Sans" panose="020B0606030504020204" pitchFamily="34" charset="0"/>
+                <a:latin typeface="Arial" panose="020B0604020202020204" pitchFamily="34" charset="0"/>
                 <a:ea typeface="Open Sans" panose="020B0606030504020204" pitchFamily="34" charset="0"/>
-                <a:cs typeface="Open Sans" panose="020B0606030504020204" pitchFamily="34" charset="0"/>
+                <a:cs typeface="Arial" panose="020B0604020202020204" pitchFamily="34" charset="0"/>
               </a:defRPr>
             </a:lvl4pPr>
             <a:lvl5pPr marL="1828800" indent="0">
@@ -1445,9 +1445,9 @@
                     <a:lumOff val="25000"/>
                   </a:schemeClr>
                 </a:solidFill>
-                <a:latin typeface="Open Sans SemiBold" panose="020B0606030504020204" pitchFamily="34" charset="0"/>
+                <a:latin typeface="Arial" panose="020B0604020202020204" pitchFamily="34" charset="0"/>
                 <a:ea typeface="Open Sans SemiBold" panose="020B0606030504020204" pitchFamily="34" charset="0"/>
-                <a:cs typeface="Open Sans SemiBold" panose="020B0606030504020204" pitchFamily="34" charset="0"/>
+                <a:cs typeface="Arial" panose="020B0604020202020204" pitchFamily="34" charset="0"/>
               </a:defRPr>
             </a:lvl1pPr>
           </a:lstStyle>
@@ -1486,6 +1486,8 @@
                     <a:tint val="75000"/>
                   </a:schemeClr>
                 </a:solidFill>
+                <a:latin typeface="Arial" panose="020B0604020202020204" pitchFamily="34" charset="0"/>
+                <a:cs typeface="Arial" panose="020B0604020202020204" pitchFamily="34" charset="0"/>
               </a:defRPr>
             </a:lvl1pPr>
             <a:lvl2pPr marL="342900" indent="0">
@@ -1591,11 +1593,19 @@
         <p:spPr/>
         <p:txBody>
           <a:bodyPr/>
-          <a:lstStyle/>
+          <a:lstStyle>
+            <a:lvl1pPr>
+              <a:defRPr>
+                <a:latin typeface="Arial" panose="020B0604020202020204" pitchFamily="34" charset="0"/>
+                <a:cs typeface="Arial" panose="020B0604020202020204" pitchFamily="34" charset="0"/>
+              </a:defRPr>
+            </a:lvl1pPr>
+          </a:lstStyle>
           <a:p>
             <a:fld id="{C764DE79-268F-4C1A-8933-263129D2AF90}" type="datetimeFigureOut">
-              <a:rPr lang="en-US" dirty="0"/>
-              <a:t>1/25/22</a:t>
+              <a:rPr lang="en-US" smtClean="0"/>
+              <a:pPr/>
+              <a:t>5/3/22</a:t>
             </a:fld>
             <a:endParaRPr lang="en-US" dirty="0"/>
           </a:p>
@@ -1614,7 +1624,14 @@
         <p:spPr/>
         <p:txBody>
           <a:bodyPr/>
-          <a:lstStyle/>
+          <a:lstStyle>
+            <a:lvl1pPr>
+              <a:defRPr>
+                <a:latin typeface="Arial" panose="020B0604020202020204" pitchFamily="34" charset="0"/>
+                <a:cs typeface="Arial" panose="020B0604020202020204" pitchFamily="34" charset="0"/>
+              </a:defRPr>
+            </a:lvl1pPr>
+          </a:lstStyle>
           <a:p>
             <a:endParaRPr lang="en-US" dirty="0"/>
           </a:p>
@@ -1633,10 +1650,18 @@
         <p:spPr/>
         <p:txBody>
           <a:bodyPr/>
-          <a:lstStyle/>
+          <a:lstStyle>
+            <a:lvl1pPr>
+              <a:defRPr>
+                <a:latin typeface="Arial" panose="020B0604020202020204" pitchFamily="34" charset="0"/>
+                <a:cs typeface="Arial" panose="020B0604020202020204" pitchFamily="34" charset="0"/>
+              </a:defRPr>
+            </a:lvl1pPr>
+          </a:lstStyle>
           <a:p>
             <a:fld id="{48F63A3B-78C7-47BE-AE5E-E10140E04643}" type="slidenum">
-              <a:rPr lang="en-US" dirty="0"/>
+              <a:rPr lang="en-US" smtClean="0"/>
+              <a:pPr/>
               <a:t>‹#›</a:t>
             </a:fld>
             <a:endParaRPr lang="en-US" dirty="0"/>
@@ -1827,7 +1852,7 @@
           <a:p>
             <a:fld id="{E70723BA-A8DB-B24C-99CB-32B8173B439B}" type="datetimeFigureOut">
               <a:rPr lang="en-US" smtClean="0"/>
-              <a:t>1/25/22</a:t>
+              <a:t>5/3/22</a:t>
             </a:fld>
             <a:endParaRPr lang="en-US"/>
           </a:p>
@@ -2194,7 +2219,7 @@
           <a:p>
             <a:fld id="{E70723BA-A8DB-B24C-99CB-32B8173B439B}" type="datetimeFigureOut">
               <a:rPr lang="en-US" smtClean="0"/>
-              <a:t>1/25/22</a:t>
+              <a:t>5/3/22</a:t>
             </a:fld>
             <a:endParaRPr lang="en-US"/>
           </a:p>
@@ -2312,7 +2337,7 @@
           <a:p>
             <a:fld id="{E70723BA-A8DB-B24C-99CB-32B8173B439B}" type="datetimeFigureOut">
               <a:rPr lang="en-US" smtClean="0"/>
-              <a:t>1/25/22</a:t>
+              <a:t>5/3/22</a:t>
             </a:fld>
             <a:endParaRPr lang="en-US" dirty="0"/>
           </a:p>
@@ -2407,7 +2432,7 @@
           <a:p>
             <a:fld id="{E70723BA-A8DB-B24C-99CB-32B8173B439B}" type="datetimeFigureOut">
               <a:rPr lang="en-US" smtClean="0"/>
-              <a:t>1/25/22</a:t>
+              <a:t>5/3/22</a:t>
             </a:fld>
             <a:endParaRPr lang="en-US"/>
           </a:p>
@@ -2684,7 +2709,7 @@
           <a:p>
             <a:fld id="{E70723BA-A8DB-B24C-99CB-32B8173B439B}" type="datetimeFigureOut">
               <a:rPr lang="en-US" smtClean="0"/>
-              <a:t>1/25/22</a:t>
+              <a:t>5/3/22</a:t>
             </a:fld>
             <a:endParaRPr lang="en-US"/>
           </a:p>
@@ -2941,7 +2966,7 @@
           <a:p>
             <a:fld id="{E70723BA-A8DB-B24C-99CB-32B8173B439B}" type="datetimeFigureOut">
               <a:rPr lang="en-US" smtClean="0"/>
-              <a:t>1/25/22</a:t>
+              <a:t>5/3/22</a:t>
             </a:fld>
             <a:endParaRPr lang="en-US"/>
           </a:p>
@@ -3157,7 +3182,7 @@
             <a:fld id="{E70723BA-A8DB-B24C-99CB-32B8173B439B}" type="datetimeFigureOut">
               <a:rPr lang="en-US" smtClean="0"/>
               <a:pPr/>
-              <a:t>1/25/22</a:t>
+              <a:t>5/3/22</a:t>
             </a:fld>
             <a:endParaRPr lang="en-US"/>
           </a:p>

</xml_diff>